<commit_message>
fix spelling and formatting
</commit_message>
<xml_diff>
--- a/CleanCode.pptx
+++ b/CleanCode.pptx
@@ -1359,6 +1359,13 @@
         </dgm:presLayoutVars>
       </dgm:prSet>
       <dgm:spPr/>
+      <dgm:t>
+        <a:bodyPr/>
+        <a:lstStyle/>
+        <a:p>
+          <a:endParaRPr lang="ru-RU"/>
+        </a:p>
+      </dgm:t>
     </dgm:pt>
     <dgm:pt modelId="{6998C62D-1852-4858-97A4-823B84A9B36A}" type="pres">
       <dgm:prSet presAssocID="{4975C9CB-47D1-40A4-AA2C-91437C2D6DCB}" presName="node" presStyleLbl="node1" presStyleIdx="0" presStyleCnt="4">
@@ -1367,6 +1374,13 @@
         </dgm:presLayoutVars>
       </dgm:prSet>
       <dgm:spPr/>
+      <dgm:t>
+        <a:bodyPr/>
+        <a:lstStyle/>
+        <a:p>
+          <a:endParaRPr lang="ru-RU"/>
+        </a:p>
+      </dgm:t>
     </dgm:pt>
     <dgm:pt modelId="{3B2415F5-355F-4281-A0C8-16ACEEC1DD29}" type="pres">
       <dgm:prSet presAssocID="{B2F0D48E-AB64-45D4-B6ED-291C293D3494}" presName="sibTrans" presStyleCnt="0"/>
@@ -1379,6 +1393,13 @@
         </dgm:presLayoutVars>
       </dgm:prSet>
       <dgm:spPr/>
+      <dgm:t>
+        <a:bodyPr/>
+        <a:lstStyle/>
+        <a:p>
+          <a:endParaRPr lang="ru-RU"/>
+        </a:p>
+      </dgm:t>
     </dgm:pt>
     <dgm:pt modelId="{62FAF332-7A37-4AB9-9667-6A63F854188A}" type="pres">
       <dgm:prSet presAssocID="{235942F8-33C2-4DB7-BBD0-0C05FA054AC1}" presName="sibTrans" presStyleCnt="0"/>
@@ -1391,6 +1412,13 @@
         </dgm:presLayoutVars>
       </dgm:prSet>
       <dgm:spPr/>
+      <dgm:t>
+        <a:bodyPr/>
+        <a:lstStyle/>
+        <a:p>
+          <a:endParaRPr lang="ru-RU"/>
+        </a:p>
+      </dgm:t>
     </dgm:pt>
     <dgm:pt modelId="{A19F6442-16E7-43F9-9CE5-8B7AE4275D49}" type="pres">
       <dgm:prSet presAssocID="{A51BFA52-D7F7-42DF-B844-2CB0BB358F49}" presName="sibTrans" presStyleCnt="0"/>
@@ -1403,26 +1431,33 @@
         </dgm:presLayoutVars>
       </dgm:prSet>
       <dgm:spPr/>
+      <dgm:t>
+        <a:bodyPr/>
+        <a:lstStyle/>
+        <a:p>
+          <a:endParaRPr lang="ru-RU"/>
+        </a:p>
+      </dgm:t>
     </dgm:pt>
   </dgm:ptLst>
   <dgm:cxnLst>
+    <dgm:cxn modelId="{9E925C94-E103-41B5-8705-64A8FAD53EA1}" srcId="{3C0DCA5F-E404-4775-A156-82C5CDE24BAE}" destId="{59FBE3DB-467F-4795-9C5A-30D0E062C97B}" srcOrd="0" destOrd="0" parTransId="{CA0A9F91-BCE4-426F-81F6-6C722DF01823}" sibTransId="{DE0179F1-1121-4365-BF1F-6919CF6B796F}"/>
+    <dgm:cxn modelId="{29D9B51C-7E02-4148-9869-5CDC77C48A7C}" srcId="{ECB9F578-0D4F-4CCB-A1EB-B4255F24531F}" destId="{17D081C2-E088-4FDD-927F-DE009755237B}" srcOrd="3" destOrd="0" parTransId="{9808CA75-7777-406A-8BFF-3DBC0B641A28}" sibTransId="{9C448658-C0FE-48FC-9502-06CE3AED8426}"/>
+    <dgm:cxn modelId="{88D92139-244F-4EBB-9F49-DD65822F9B29}" type="presOf" srcId="{17D081C2-E088-4FDD-927F-DE009755237B}" destId="{D2A489EC-4CCD-4360-85AF-2DC35485AA70}" srcOrd="0" destOrd="0" presId="urn:microsoft.com/office/officeart/2005/8/layout/default"/>
+    <dgm:cxn modelId="{565DD236-F183-4A16-9DE4-4AD69A103D9B}" type="presOf" srcId="{228D2D4C-4EED-4EF2-88D8-0C412AAF37FC}" destId="{D2A489EC-4CCD-4360-85AF-2DC35485AA70}" srcOrd="0" destOrd="1" presId="urn:microsoft.com/office/officeart/2005/8/layout/default"/>
+    <dgm:cxn modelId="{9645BE00-BD32-4AEA-8081-F66572141259}" type="presOf" srcId="{37E78DDA-A5D0-4098-9CBE-7612328D1D79}" destId="{B2D87657-E6DA-43C2-8D3E-373C72EDA23D}" srcOrd="0" destOrd="0" presId="urn:microsoft.com/office/officeart/2005/8/layout/default"/>
+    <dgm:cxn modelId="{21D9A591-0A48-4091-B773-743B8FCD3ACD}" srcId="{17D081C2-E088-4FDD-927F-DE009755237B}" destId="{228D2D4C-4EED-4EF2-88D8-0C412AAF37FC}" srcOrd="0" destOrd="0" parTransId="{964D75B5-FC27-4289-BEFE-AC9966DA926F}" sibTransId="{FF39CDE4-837D-466E-BA80-1CCDCF785253}"/>
     <dgm:cxn modelId="{9EBAD6CB-225F-4B94-9851-BED248FF8AA4}" type="presOf" srcId="{3C0DCA5F-E404-4775-A156-82C5CDE24BAE}" destId="{8A75B25A-85B6-4F6F-9BE7-029692A2CA64}" srcOrd="0" destOrd="0" presId="urn:microsoft.com/office/officeart/2005/8/layout/default"/>
-    <dgm:cxn modelId="{0C9C9B54-9277-4AAF-AFB3-44C7442EF7C0}" type="presOf" srcId="{59FBE3DB-467F-4795-9C5A-30D0E062C97B}" destId="{8A75B25A-85B6-4F6F-9BE7-029692A2CA64}" srcOrd="0" destOrd="1" presId="urn:microsoft.com/office/officeart/2005/8/layout/default"/>
-    <dgm:cxn modelId="{9E925C94-E103-41B5-8705-64A8FAD53EA1}" srcId="{3C0DCA5F-E404-4775-A156-82C5CDE24BAE}" destId="{59FBE3DB-467F-4795-9C5A-30D0E062C97B}" srcOrd="0" destOrd="0" parTransId="{CA0A9F91-BCE4-426F-81F6-6C722DF01823}" sibTransId="{DE0179F1-1121-4365-BF1F-6919CF6B796F}"/>
+    <dgm:cxn modelId="{A5208B00-1902-4C9C-8BA3-D108186A7EEB}" type="presOf" srcId="{4975C9CB-47D1-40A4-AA2C-91437C2D6DCB}" destId="{6998C62D-1852-4858-97A4-823B84A9B36A}" srcOrd="0" destOrd="0" presId="urn:microsoft.com/office/officeart/2005/8/layout/default"/>
+    <dgm:cxn modelId="{36A7A9F3-DB93-48A8-8B23-E7D01CDF79F2}" srcId="{4975C9CB-47D1-40A4-AA2C-91437C2D6DCB}" destId="{D4AF1871-EF89-4646-A781-AD842A640D91}" srcOrd="0" destOrd="0" parTransId="{0AC11A2D-7326-42C1-A7F9-4B3E3898F54D}" sibTransId="{121C2E23-34C8-40F7-AB94-D7C87DAD2C3C}"/>
+    <dgm:cxn modelId="{76BE8CA1-88C6-4829-9005-AE72768C3852}" srcId="{ECB9F578-0D4F-4CCB-A1EB-B4255F24531F}" destId="{4975C9CB-47D1-40A4-AA2C-91437C2D6DCB}" srcOrd="0" destOrd="0" parTransId="{8CFF7E9B-B9C6-4264-AADA-401DCC3697D6}" sibTransId="{B2F0D48E-AB64-45D4-B6ED-291C293D3494}"/>
+    <dgm:cxn modelId="{ECFD8840-3CFF-4CB7-BF89-5D947C651218}" type="presOf" srcId="{ECB9F578-0D4F-4CCB-A1EB-B4255F24531F}" destId="{F76DC8A2-F6D6-4B0B-A7D5-3E789140F6B1}" srcOrd="0" destOrd="0" presId="urn:microsoft.com/office/officeart/2005/8/layout/default"/>
     <dgm:cxn modelId="{64439448-2703-4A21-B5B2-E8E90505881E}" srcId="{37E78DDA-A5D0-4098-9CBE-7612328D1D79}" destId="{F9D5C380-62C3-48A3-A33A-744A7F68397D}" srcOrd="0" destOrd="0" parTransId="{DF308B09-61A6-4F5A-AE0F-C31519B2F6A2}" sibTransId="{BC2FFE06-599D-4637-8DB2-761E7853A822}"/>
-    <dgm:cxn modelId="{565DD236-F183-4A16-9DE4-4AD69A103D9B}" type="presOf" srcId="{228D2D4C-4EED-4EF2-88D8-0C412AAF37FC}" destId="{D2A489EC-4CCD-4360-85AF-2DC35485AA70}" srcOrd="0" destOrd="1" presId="urn:microsoft.com/office/officeart/2005/8/layout/default"/>
-    <dgm:cxn modelId="{76BE8CA1-88C6-4829-9005-AE72768C3852}" srcId="{ECB9F578-0D4F-4CCB-A1EB-B4255F24531F}" destId="{4975C9CB-47D1-40A4-AA2C-91437C2D6DCB}" srcOrd="0" destOrd="0" parTransId="{8CFF7E9B-B9C6-4264-AADA-401DCC3697D6}" sibTransId="{B2F0D48E-AB64-45D4-B6ED-291C293D3494}"/>
-    <dgm:cxn modelId="{36A7A9F3-DB93-48A8-8B23-E7D01CDF79F2}" srcId="{4975C9CB-47D1-40A4-AA2C-91437C2D6DCB}" destId="{D4AF1871-EF89-4646-A781-AD842A640D91}" srcOrd="0" destOrd="0" parTransId="{0AC11A2D-7326-42C1-A7F9-4B3E3898F54D}" sibTransId="{121C2E23-34C8-40F7-AB94-D7C87DAD2C3C}"/>
-    <dgm:cxn modelId="{88D92139-244F-4EBB-9F49-DD65822F9B29}" type="presOf" srcId="{17D081C2-E088-4FDD-927F-DE009755237B}" destId="{D2A489EC-4CCD-4360-85AF-2DC35485AA70}" srcOrd="0" destOrd="0" presId="urn:microsoft.com/office/officeart/2005/8/layout/default"/>
-    <dgm:cxn modelId="{D7A11630-8B42-4019-BDCF-21BF0B03CA99}" srcId="{ECB9F578-0D4F-4CCB-A1EB-B4255F24531F}" destId="{37E78DDA-A5D0-4098-9CBE-7612328D1D79}" srcOrd="2" destOrd="0" parTransId="{5BCE516B-DBAC-481D-807A-6CDB111188F5}" sibTransId="{A51BFA52-D7F7-42DF-B844-2CB0BB358F49}"/>
-    <dgm:cxn modelId="{A5208B00-1902-4C9C-8BA3-D108186A7EEB}" type="presOf" srcId="{4975C9CB-47D1-40A4-AA2C-91437C2D6DCB}" destId="{6998C62D-1852-4858-97A4-823B84A9B36A}" srcOrd="0" destOrd="0" presId="urn:microsoft.com/office/officeart/2005/8/layout/default"/>
-    <dgm:cxn modelId="{21D9A591-0A48-4091-B773-743B8FCD3ACD}" srcId="{17D081C2-E088-4FDD-927F-DE009755237B}" destId="{228D2D4C-4EED-4EF2-88D8-0C412AAF37FC}" srcOrd="0" destOrd="0" parTransId="{964D75B5-FC27-4289-BEFE-AC9966DA926F}" sibTransId="{FF39CDE4-837D-466E-BA80-1CCDCF785253}"/>
-    <dgm:cxn modelId="{ECFD8840-3CFF-4CB7-BF89-5D947C651218}" type="presOf" srcId="{ECB9F578-0D4F-4CCB-A1EB-B4255F24531F}" destId="{F76DC8A2-F6D6-4B0B-A7D5-3E789140F6B1}" srcOrd="0" destOrd="0" presId="urn:microsoft.com/office/officeart/2005/8/layout/default"/>
     <dgm:cxn modelId="{8082E2B8-5DEC-465F-979D-598D61F72339}" type="presOf" srcId="{D4AF1871-EF89-4646-A781-AD842A640D91}" destId="{6998C62D-1852-4858-97A4-823B84A9B36A}" srcOrd="0" destOrd="1" presId="urn:microsoft.com/office/officeart/2005/8/layout/default"/>
     <dgm:cxn modelId="{999A646D-41C2-453A-B91B-AF54D124A6AB}" srcId="{ECB9F578-0D4F-4CCB-A1EB-B4255F24531F}" destId="{3C0DCA5F-E404-4775-A156-82C5CDE24BAE}" srcOrd="1" destOrd="0" parTransId="{ED0CDB17-298F-4357-A514-EB6BDC536B92}" sibTransId="{235942F8-33C2-4DB7-BBD0-0C05FA054AC1}"/>
+    <dgm:cxn modelId="{D7A11630-8B42-4019-BDCF-21BF0B03CA99}" srcId="{ECB9F578-0D4F-4CCB-A1EB-B4255F24531F}" destId="{37E78DDA-A5D0-4098-9CBE-7612328D1D79}" srcOrd="2" destOrd="0" parTransId="{5BCE516B-DBAC-481D-807A-6CDB111188F5}" sibTransId="{A51BFA52-D7F7-42DF-B844-2CB0BB358F49}"/>
+    <dgm:cxn modelId="{0C9C9B54-9277-4AAF-AFB3-44C7442EF7C0}" type="presOf" srcId="{59FBE3DB-467F-4795-9C5A-30D0E062C97B}" destId="{8A75B25A-85B6-4F6F-9BE7-029692A2CA64}" srcOrd="0" destOrd="1" presId="urn:microsoft.com/office/officeart/2005/8/layout/default"/>
     <dgm:cxn modelId="{3E286BED-150A-4992-99DE-000AC01597E0}" type="presOf" srcId="{F9D5C380-62C3-48A3-A33A-744A7F68397D}" destId="{B2D87657-E6DA-43C2-8D3E-373C72EDA23D}" srcOrd="0" destOrd="1" presId="urn:microsoft.com/office/officeart/2005/8/layout/default"/>
-    <dgm:cxn modelId="{9645BE00-BD32-4AEA-8081-F66572141259}" type="presOf" srcId="{37E78DDA-A5D0-4098-9CBE-7612328D1D79}" destId="{B2D87657-E6DA-43C2-8D3E-373C72EDA23D}" srcOrd="0" destOrd="0" presId="urn:microsoft.com/office/officeart/2005/8/layout/default"/>
-    <dgm:cxn modelId="{29D9B51C-7E02-4148-9869-5CDC77C48A7C}" srcId="{ECB9F578-0D4F-4CCB-A1EB-B4255F24531F}" destId="{17D081C2-E088-4FDD-927F-DE009755237B}" srcOrd="3" destOrd="0" parTransId="{9808CA75-7777-406A-8BFF-3DBC0B641A28}" sibTransId="{9C448658-C0FE-48FC-9502-06CE3AED8426}"/>
     <dgm:cxn modelId="{60F7CFFB-8125-433E-8D4C-56CAB4D9FA8A}" type="presParOf" srcId="{F76DC8A2-F6D6-4B0B-A7D5-3E789140F6B1}" destId="{6998C62D-1852-4858-97A4-823B84A9B36A}" srcOrd="0" destOrd="0" presId="urn:microsoft.com/office/officeart/2005/8/layout/default"/>
     <dgm:cxn modelId="{274D820A-14C5-4C60-8727-D9110C22EA1B}" type="presParOf" srcId="{F76DC8A2-F6D6-4B0B-A7D5-3E789140F6B1}" destId="{3B2415F5-355F-4281-A0C8-16ACEEC1DD29}" srcOrd="1" destOrd="0" presId="urn:microsoft.com/office/officeart/2005/8/layout/default"/>
     <dgm:cxn modelId="{BF93C40A-67C9-4FD7-B516-01D420A8C71C}" type="presParOf" srcId="{F76DC8A2-F6D6-4B0B-A7D5-3E789140F6B1}" destId="{8A75B25A-85B6-4F6F-9BE7-029692A2CA64}" srcOrd="2" destOrd="0" presId="urn:microsoft.com/office/officeart/2005/8/layout/default"/>
@@ -1504,7 +1539,7 @@
         </a:bodyPr>
         <a:lstStyle/>
         <a:p>
-          <a:pPr marL="0" lvl="0" indent="0" algn="l" defTabSz="977900">
+          <a:pPr lvl="0" algn="l" defTabSz="977900">
             <a:lnSpc>
               <a:spcPct val="90000"/>
             </a:lnSpc>
@@ -1514,7 +1549,6 @@
             <a:spcAft>
               <a:spcPct val="35000"/>
             </a:spcAft>
-            <a:buNone/>
           </a:pPr>
           <a:r>
             <a:rPr lang="en-US" sz="2200" kern="1200" dirty="0"/>
@@ -1533,7 +1567,7 @@
             <a:spcAft>
               <a:spcPct val="15000"/>
             </a:spcAft>
-            <a:buChar char="•"/>
+            <a:buChar char="••"/>
           </a:pPr>
           <a:r>
             <a:rPr lang="x-none" sz="1700" kern="1200" dirty="0"/>
@@ -1602,7 +1636,7 @@
         </a:bodyPr>
         <a:lstStyle/>
         <a:p>
-          <a:pPr marL="0" lvl="0" indent="0" algn="l" defTabSz="977900">
+          <a:pPr lvl="0" algn="l" defTabSz="977900">
             <a:lnSpc>
               <a:spcPct val="90000"/>
             </a:lnSpc>
@@ -1612,7 +1646,6 @@
             <a:spcAft>
               <a:spcPct val="35000"/>
             </a:spcAft>
-            <a:buNone/>
           </a:pPr>
           <a:r>
             <a:rPr lang="en-US" sz="2200" kern="1200" dirty="0"/>
@@ -1639,7 +1672,7 @@
             <a:spcAft>
               <a:spcPct val="15000"/>
             </a:spcAft>
-            <a:buChar char="•"/>
+            <a:buChar char="••"/>
           </a:pPr>
           <a:r>
             <a:rPr lang="ru-RU" sz="1700" kern="1200" dirty="0"/>
@@ -1712,7 +1745,7 @@
         </a:bodyPr>
         <a:lstStyle/>
         <a:p>
-          <a:pPr marL="0" lvl="0" indent="0" algn="l" defTabSz="977900">
+          <a:pPr lvl="0" algn="l" defTabSz="977900">
             <a:lnSpc>
               <a:spcPct val="90000"/>
             </a:lnSpc>
@@ -1722,7 +1755,6 @@
             <a:spcAft>
               <a:spcPct val="35000"/>
             </a:spcAft>
-            <a:buNone/>
           </a:pPr>
           <a:r>
             <a:rPr lang="en-US" sz="2200" kern="1200" dirty="0"/>
@@ -1741,7 +1773,7 @@
             <a:spcAft>
               <a:spcPct val="15000"/>
             </a:spcAft>
-            <a:buChar char="•"/>
+            <a:buChar char="••"/>
           </a:pPr>
           <a:r>
             <a:rPr lang="ru-RU" sz="1700" kern="1200" dirty="0"/>
@@ -1809,7 +1841,7 @@
         </a:bodyPr>
         <a:lstStyle/>
         <a:p>
-          <a:pPr marL="0" lvl="0" indent="0" algn="l" defTabSz="977900">
+          <a:pPr lvl="0" algn="l" defTabSz="977900">
             <a:lnSpc>
               <a:spcPct val="90000"/>
             </a:lnSpc>
@@ -1819,7 +1851,6 @@
             <a:spcAft>
               <a:spcPct val="35000"/>
             </a:spcAft>
-            <a:buNone/>
           </a:pPr>
           <a:r>
             <a:rPr lang="en-US" sz="2200" kern="1200"/>
@@ -1838,7 +1869,7 @@
             <a:spcAft>
               <a:spcPct val="15000"/>
             </a:spcAft>
-            <a:buChar char="•"/>
+            <a:buChar char="••"/>
           </a:pPr>
           <a:r>
             <a:rPr lang="ru-RU" sz="1700" kern="1200" dirty="0"/>
@@ -3906,6 +3937,10 @@
               </a:rPr>
               <a:t>У бойскаутов существует простое правило, которое применимо и к нашей профессии:</a:t>
             </a:r>
+            <a:r>
+              <a:rPr lang="ru-RU" i="0" dirty="0"/>
+              <a:t/>
+            </a:r>
             <a:br>
               <a:rPr lang="ru-RU" i="0" dirty="0"/>
             </a:br>
@@ -3920,6 +3955,10 @@
                 <a:cs typeface="+mn-cs"/>
               </a:rPr>
               <a:t>Оставь место стоянки чище, чем оно было до твоего прихода.</a:t>
+            </a:r>
+            <a:r>
+              <a:rPr lang="ru-RU" i="0" dirty="0"/>
+              <a:t/>
             </a:r>
             <a:br>
               <a:rPr lang="ru-RU" i="0" dirty="0"/>
@@ -8481,8 +8520,16 @@
               <a:t>Маркеры плохой </a:t>
             </a:r>
             <a:r>
-              <a:rPr lang="ru-RU" sz="4400" dirty="0" err="1"/>
-              <a:t>компановки</a:t>
+              <a:rPr lang="ru-RU" sz="4400" dirty="0" smtClean="0"/>
+              <a:t>комп</a:t>
+            </a:r>
+            <a:r>
+              <a:rPr lang="ru-RU" sz="4400" dirty="0"/>
+              <a:t>о</a:t>
+            </a:r>
+            <a:r>
+              <a:rPr lang="ru-RU" sz="4400" dirty="0" smtClean="0"/>
+              <a:t>новки</a:t>
             </a:r>
             <a:endParaRPr lang="ru-RU" sz="4400" dirty="0"/>
           </a:p>
@@ -8655,8 +8702,8 @@
               <a:t>ДЗ «Плохая </a:t>
             </a:r>
             <a:r>
-              <a:rPr lang="ru-RU" dirty="0" err="1"/>
-              <a:t>компановка</a:t>
+              <a:rPr lang="ru-RU" dirty="0" smtClean="0"/>
+              <a:t>компоновка</a:t>
             </a:r>
             <a:r>
               <a:rPr lang="ru-RU" dirty="0"/>
@@ -9692,6 +9739,19 @@
               </a:rPr>
               <a:t>() </a:t>
             </a:r>
+            <a:r>
+              <a:rPr lang="ru-RU" sz="2400" dirty="0">
+                <a:solidFill>
+                  <a:srgbClr val="000000"/>
+                </a:solidFill>
+                <a:highlight>
+                  <a:srgbClr val="FFFFFF"/>
+                </a:highlight>
+                <a:latin typeface="Fira Code" panose="00000509000000000000" pitchFamily="49" charset="0"/>
+                <a:ea typeface="Fira Code" panose="00000509000000000000" pitchFamily="49" charset="0"/>
+              </a:rPr>
+              <a:t/>
+            </a:r>
             <a:br>
               <a:rPr lang="ru-RU" sz="2400" dirty="0">
                 <a:solidFill>
@@ -9802,7 +9862,7 @@
         <p:spPr>
           <a:xfrm>
             <a:off x="323528" y="260648"/>
-            <a:ext cx="8266587" cy="4708981"/>
+            <a:ext cx="8496944" cy="4708981"/>
           </a:xfrm>
           <a:prstGeom prst="rect">
             <a:avLst/>
@@ -10624,6 +10684,10 @@
               <a:rPr lang="ru-RU" dirty="0"/>
               <a:t>Пишите код так, </a:t>
             </a:r>
+            <a:r>
+              <a:rPr lang="en-US" dirty="0"/>
+              <a:t/>
+            </a:r>
             <a:br>
               <a:rPr lang="en-US" dirty="0"/>
             </a:br>
@@ -10746,7 +10810,7 @@
         <p:spPr>
           <a:xfrm>
             <a:off x="323528" y="260648"/>
-            <a:ext cx="8390466" cy="4893647"/>
+            <a:ext cx="8820472" cy="4893647"/>
           </a:xfrm>
           <a:prstGeom prst="rect">
             <a:avLst/>
@@ -11377,6 +11441,19 @@
               </a:rPr>
               <a:t>(</a:t>
             </a:r>
+            <a:r>
+              <a:rPr lang="ru-RU" sz="1400" dirty="0">
+                <a:solidFill>
+                  <a:srgbClr val="000000"/>
+                </a:solidFill>
+                <a:highlight>
+                  <a:srgbClr val="FFFFFF"/>
+                </a:highlight>
+                <a:latin typeface="Fira Code" panose="00000509000000000000" pitchFamily="49" charset="0"/>
+                <a:ea typeface="Fira Code" panose="00000509000000000000" pitchFamily="49" charset="0"/>
+              </a:rPr>
+              <a:t/>
+            </a:r>
             <a:br>
               <a:rPr lang="ru-RU" sz="1400" dirty="0">
                 <a:solidFill>
@@ -12142,6 +12219,19 @@
               </a:rPr>
               <a:t>) </a:t>
             </a:r>
+            <a:r>
+              <a:rPr lang="ru-RU" sz="1400" dirty="0">
+                <a:solidFill>
+                  <a:srgbClr val="000000"/>
+                </a:solidFill>
+                <a:highlight>
+                  <a:srgbClr val="FFFFFF"/>
+                </a:highlight>
+                <a:latin typeface="Fira Code" panose="00000509000000000000" pitchFamily="49" charset="0"/>
+                <a:ea typeface="Fira Code" panose="00000509000000000000" pitchFamily="49" charset="0"/>
+              </a:rPr>
+              <a:t/>
+            </a:r>
             <a:br>
               <a:rPr lang="ru-RU" sz="1400" dirty="0">
                 <a:solidFill>
@@ -12575,6 +12665,19 @@
                 <a:ea typeface="Fira Code" panose="00000509000000000000" pitchFamily="49" charset="0"/>
               </a:rPr>
               <a:t>) </a:t>
+            </a:r>
+            <a:r>
+              <a:rPr lang="ru-RU" sz="1400" dirty="0">
+                <a:solidFill>
+                  <a:srgbClr val="000000"/>
+                </a:solidFill>
+                <a:highlight>
+                  <a:srgbClr val="FFFFFF"/>
+                </a:highlight>
+                <a:latin typeface="Fira Code" panose="00000509000000000000" pitchFamily="49" charset="0"/>
+                <a:ea typeface="Fira Code" panose="00000509000000000000" pitchFamily="49" charset="0"/>
+              </a:rPr>
+              <a:t/>
             </a:r>
             <a:br>
               <a:rPr lang="ru-RU" sz="1400" dirty="0">
@@ -13858,6 +13961,19 @@
               </a:rPr>
               <a:t>(</a:t>
             </a:r>
+            <a:r>
+              <a:rPr lang="ru-RU" dirty="0">
+                <a:solidFill>
+                  <a:srgbClr val="000000"/>
+                </a:solidFill>
+                <a:highlight>
+                  <a:srgbClr val="FFFFFF"/>
+                </a:highlight>
+                <a:latin typeface="Fira Code" panose="00000509000000000000" pitchFamily="49" charset="0"/>
+                <a:ea typeface="Fira Code" panose="00000509000000000000" pitchFamily="49" charset="0"/>
+              </a:rPr>
+              <a:t/>
+            </a:r>
             <a:br>
               <a:rPr lang="ru-RU" dirty="0">
                 <a:solidFill>
@@ -14012,6 +14128,19 @@
               </a:rPr>
               <a:t>[] merged)</a:t>
             </a:r>
+            <a:r>
+              <a:rPr lang="ru-RU" dirty="0">
+                <a:solidFill>
+                  <a:srgbClr val="000000"/>
+                </a:solidFill>
+                <a:highlight>
+                  <a:srgbClr val="FFFFFF"/>
+                </a:highlight>
+                <a:latin typeface="Fira Code" panose="00000509000000000000" pitchFamily="49" charset="0"/>
+                <a:ea typeface="Fira Code" panose="00000509000000000000" pitchFamily="49" charset="0"/>
+              </a:rPr>
+              <a:t/>
+            </a:r>
             <a:br>
               <a:rPr lang="ru-RU" dirty="0">
                 <a:solidFill>
@@ -14389,6 +14518,19 @@
               </a:rPr>
               <a:t>)) </a:t>
             </a:r>
+            <a:r>
+              <a:rPr lang="ru-RU" dirty="0">
+                <a:solidFill>
+                  <a:srgbClr val="000000"/>
+                </a:solidFill>
+                <a:highlight>
+                  <a:srgbClr val="FFFFFF"/>
+                </a:highlight>
+                <a:latin typeface="Fira Code" panose="00000509000000000000" pitchFamily="49" charset="0"/>
+                <a:ea typeface="Fira Code" panose="00000509000000000000" pitchFamily="49" charset="0"/>
+              </a:rPr>
+              <a:t/>
+            </a:r>
             <a:br>
               <a:rPr lang="ru-RU" dirty="0">
                 <a:solidFill>
@@ -14584,6 +14726,19 @@
                 <a:ea typeface="Fira Code" panose="00000509000000000000" pitchFamily="49" charset="0"/>
               </a:rPr>
               <a:t>)) </a:t>
+            </a:r>
+            <a:r>
+              <a:rPr lang="ru-RU" dirty="0">
+                <a:solidFill>
+                  <a:srgbClr val="000000"/>
+                </a:solidFill>
+                <a:highlight>
+                  <a:srgbClr val="FFFFFF"/>
+                </a:highlight>
+                <a:latin typeface="Fira Code" panose="00000509000000000000" pitchFamily="49" charset="0"/>
+                <a:ea typeface="Fira Code" panose="00000509000000000000" pitchFamily="49" charset="0"/>
+              </a:rPr>
+              <a:t/>
             </a:r>
             <a:br>
               <a:rPr lang="ru-RU" dirty="0">
@@ -14985,6 +15140,19 @@
                 <a:ea typeface="Fira Code" panose="00000509000000000000" pitchFamily="49" charset="0"/>
               </a:rPr>
               <a:t>)) </a:t>
+            </a:r>
+            <a:r>
+              <a:rPr lang="ru-RU" dirty="0">
+                <a:solidFill>
+                  <a:srgbClr val="000000"/>
+                </a:solidFill>
+                <a:highlight>
+                  <a:srgbClr val="FFFFFF"/>
+                </a:highlight>
+                <a:latin typeface="Fira Code" panose="00000509000000000000" pitchFamily="49" charset="0"/>
+                <a:ea typeface="Fira Code" panose="00000509000000000000" pitchFamily="49" charset="0"/>
+              </a:rPr>
+              <a:t/>
             </a:r>
             <a:br>
               <a:rPr lang="ru-RU" dirty="0">

</xml_diff>